<commit_message>
Made changes in EDA file and Customer churn prediction Presentation
</commit_message>
<xml_diff>
--- a/Customer Churn Project/Customer churn prediction.pptx
+++ b/Customer Churn Project/Customer churn prediction.pptx
@@ -9953,125 +9953,191 @@
                 <a:latin typeface="Times New Roman" panose="02020603050405020304" pitchFamily="18" charset="0"/>
                 <a:cs typeface="Times New Roman" panose="02020603050405020304" pitchFamily="18" charset="0"/>
               </a:rPr>
-              <a:t>• Both </a:t>
-            </a:r>
-            <a:r>
-              <a:rPr lang="en-US" sz="1600" b="1" i="1" dirty="0">
-                <a:latin typeface="Times New Roman" panose="02020603050405020304" pitchFamily="18" charset="0"/>
-                <a:cs typeface="Times New Roman" panose="02020603050405020304" pitchFamily="18" charset="0"/>
-              </a:rPr>
-              <a:t>Male &amp; Female </a:t>
-            </a:r>
+              <a:t>• </a:t>
+            </a:r>
+            <a:r>
+              <a:rPr lang="en-US" sz="1400" b="0" i="0" dirty="0">
+                <a:solidFill>
+                  <a:srgbClr val="000000"/>
+                </a:solidFill>
+                <a:effectLst/>
+                <a:latin typeface="Helvetica Neue"/>
+              </a:rPr>
+              <a:t>Customers who are </a:t>
+            </a:r>
+            <a:r>
+              <a:rPr lang="en-US" sz="1400" b="1" i="1" dirty="0">
+                <a:solidFill>
+                  <a:srgbClr val="000000"/>
+                </a:solidFill>
+                <a:effectLst/>
+                <a:latin typeface="Helvetica Neue"/>
+              </a:rPr>
+              <a:t>not Senior citizens</a:t>
+            </a:r>
+            <a:r>
+              <a:rPr lang="en-US" sz="1400" b="0" i="1" dirty="0">
+                <a:solidFill>
+                  <a:srgbClr val="000000"/>
+                </a:solidFill>
+                <a:effectLst/>
+                <a:latin typeface="Helvetica Neue"/>
+              </a:rPr>
+              <a:t> </a:t>
+            </a:r>
+            <a:r>
+              <a:rPr lang="en-US" sz="1400" b="0" i="0" dirty="0">
+                <a:solidFill>
+                  <a:srgbClr val="000000"/>
+                </a:solidFill>
+                <a:effectLst/>
+                <a:latin typeface="Helvetica Neue"/>
+              </a:rPr>
+              <a:t>are   </a:t>
+            </a:r>
+          </a:p>
+          <a:p>
+            <a:r>
+              <a:rPr lang="en-US" sz="1400" dirty="0">
+                <a:solidFill>
+                  <a:srgbClr val="000000"/>
+                </a:solidFill>
+                <a:latin typeface="Helvetica Neue"/>
+              </a:rPr>
+              <a:t>   </a:t>
+            </a:r>
+            <a:r>
+              <a:rPr lang="en-US" sz="1400" b="0" i="0" dirty="0">
+                <a:solidFill>
+                  <a:srgbClr val="000000"/>
+                </a:solidFill>
+                <a:effectLst/>
+                <a:latin typeface="Helvetica Neue"/>
+              </a:rPr>
+              <a:t>are </a:t>
+            </a:r>
+            <a:r>
+              <a:rPr lang="en-US" sz="1400" b="1" i="1" dirty="0">
+                <a:solidFill>
+                  <a:srgbClr val="000000"/>
+                </a:solidFill>
+                <a:effectLst/>
+                <a:latin typeface="Helvetica Neue"/>
+              </a:rPr>
+              <a:t>more churners.</a:t>
+            </a:r>
+            <a:endParaRPr lang="en-US" sz="1600" i="1" dirty="0">
+              <a:latin typeface="Times New Roman" panose="02020603050405020304" pitchFamily="18" charset="0"/>
+              <a:cs typeface="Times New Roman" panose="02020603050405020304" pitchFamily="18" charset="0"/>
+            </a:endParaRPr>
+          </a:p>
+        </p:txBody>
+      </p:sp>
+      <p:sp>
+        <p:nvSpPr>
+          <p:cNvPr id="11" name="TextBox 10">
+            <a:extLst>
+              <a:ext uri="{FF2B5EF4-FFF2-40B4-BE49-F238E27FC236}">
+                <a16:creationId xmlns:a16="http://schemas.microsoft.com/office/drawing/2014/main" id="{E75DEFC8-105F-AD94-43BA-E08E1A9EB53C}"/>
+              </a:ext>
+            </a:extLst>
+          </p:cNvPr>
+          <p:cNvSpPr txBox="1"/>
+          <p:nvPr/>
+        </p:nvSpPr>
+        <p:spPr>
+          <a:xfrm>
+            <a:off x="4969398" y="3930962"/>
+            <a:ext cx="4163632" cy="800219"/>
+          </a:xfrm>
+          <a:prstGeom prst="rect">
+            <a:avLst/>
+          </a:prstGeom>
+          <a:noFill/>
+        </p:spPr>
+        <p:txBody>
+          <a:bodyPr wrap="square" rtlCol="0">
+            <a:spAutoFit/>
+          </a:bodyPr>
+          <a:lstStyle/>
+          <a:p>
+            <a:r>
+              <a:rPr lang="en-US" sz="1600" b="1" dirty="0"/>
+              <a:t>Variable : Partner    Hue : Senior Citizen</a:t>
+            </a:r>
+          </a:p>
+          <a:p>
             <a:r>
               <a:rPr lang="en-US" sz="1600" dirty="0">
                 <a:latin typeface="Times New Roman" panose="02020603050405020304" pitchFamily="18" charset="0"/>
                 <a:cs typeface="Times New Roman" panose="02020603050405020304" pitchFamily="18" charset="0"/>
               </a:rPr>
-              <a:t>that </a:t>
-            </a:r>
-            <a:r>
-              <a:rPr lang="en-US" sz="1600" b="1" i="1" dirty="0">
-                <a:latin typeface="Times New Roman" panose="02020603050405020304" pitchFamily="18" charset="0"/>
-                <a:cs typeface="Times New Roman" panose="02020603050405020304" pitchFamily="18" charset="0"/>
-              </a:rPr>
-              <a:t>aren’t Senior- </a:t>
-            </a:r>
-          </a:p>
-          <a:p>
-            <a:r>
-              <a:rPr lang="en-US" sz="1600" b="1" i="1" dirty="0">
-                <a:latin typeface="Times New Roman" panose="02020603050405020304" pitchFamily="18" charset="0"/>
-                <a:cs typeface="Times New Roman" panose="02020603050405020304" pitchFamily="18" charset="0"/>
-              </a:rPr>
-              <a:t>  Citizen</a:t>
-            </a:r>
-            <a:r>
-              <a:rPr lang="en-US" sz="1600" dirty="0">
-                <a:latin typeface="Times New Roman" panose="02020603050405020304" pitchFamily="18" charset="0"/>
-                <a:cs typeface="Times New Roman" panose="02020603050405020304" pitchFamily="18" charset="0"/>
-              </a:rPr>
-              <a:t> are more likely to churn.</a:t>
-            </a:r>
-          </a:p>
-        </p:txBody>
-      </p:sp>
-      <p:sp>
-        <p:nvSpPr>
-          <p:cNvPr id="11" name="TextBox 10">
-            <a:extLst>
-              <a:ext uri="{FF2B5EF4-FFF2-40B4-BE49-F238E27FC236}">
-                <a16:creationId xmlns:a16="http://schemas.microsoft.com/office/drawing/2014/main" id="{E75DEFC8-105F-AD94-43BA-E08E1A9EB53C}"/>
-              </a:ext>
-            </a:extLst>
-          </p:cNvPr>
-          <p:cNvSpPr txBox="1"/>
-          <p:nvPr/>
-        </p:nvSpPr>
-        <p:spPr>
-          <a:xfrm>
-            <a:off x="4969398" y="3930962"/>
-            <a:ext cx="3996184" cy="830997"/>
-          </a:xfrm>
-          <a:prstGeom prst="rect">
-            <a:avLst/>
-          </a:prstGeom>
-          <a:noFill/>
-        </p:spPr>
-        <p:txBody>
-          <a:bodyPr wrap="square" rtlCol="0">
-            <a:spAutoFit/>
-          </a:bodyPr>
-          <a:lstStyle/>
-          <a:p>
-            <a:r>
-              <a:rPr lang="en-US" sz="1600" b="1" dirty="0"/>
-              <a:t>Variable : Partner    Hue : Senior Citizen</a:t>
-            </a:r>
-          </a:p>
-          <a:p>
-            <a:r>
-              <a:rPr lang="en-US" sz="1600" dirty="0">
-                <a:latin typeface="Times New Roman" panose="02020603050405020304" pitchFamily="18" charset="0"/>
-                <a:cs typeface="Times New Roman" panose="02020603050405020304" pitchFamily="18" charset="0"/>
-              </a:rPr>
-              <a:t>• Subscribers that </a:t>
-            </a:r>
-            <a:r>
-              <a:rPr lang="en-US" sz="1600" b="1" i="1" dirty="0">
-                <a:latin typeface="Times New Roman" panose="02020603050405020304" pitchFamily="18" charset="0"/>
-                <a:cs typeface="Times New Roman" panose="02020603050405020304" pitchFamily="18" charset="0"/>
-              </a:rPr>
-              <a:t>don’t have Partner </a:t>
-            </a:r>
-            <a:r>
-              <a:rPr lang="en-US" sz="1600" dirty="0">
-                <a:latin typeface="Times New Roman" panose="02020603050405020304" pitchFamily="18" charset="0"/>
-                <a:cs typeface="Times New Roman" panose="02020603050405020304" pitchFamily="18" charset="0"/>
-              </a:rPr>
-              <a:t>&amp; </a:t>
-            </a:r>
-            <a:r>
-              <a:rPr lang="en-US" sz="1600" b="1" i="1" dirty="0">
-                <a:latin typeface="Times New Roman" panose="02020603050405020304" pitchFamily="18" charset="0"/>
-                <a:cs typeface="Times New Roman" panose="02020603050405020304" pitchFamily="18" charset="0"/>
-              </a:rPr>
-              <a:t>Non-    </a:t>
-            </a:r>
-          </a:p>
-          <a:p>
-            <a:r>
-              <a:rPr lang="en-US" sz="1600" b="1" i="1" dirty="0">
-                <a:latin typeface="Times New Roman" panose="02020603050405020304" pitchFamily="18" charset="0"/>
-                <a:cs typeface="Times New Roman" panose="02020603050405020304" pitchFamily="18" charset="0"/>
-              </a:rPr>
-              <a:t>  senior citizen</a:t>
-            </a:r>
-            <a:r>
-              <a:rPr lang="en-US" sz="1600" dirty="0">
-                <a:latin typeface="Times New Roman" panose="02020603050405020304" pitchFamily="18" charset="0"/>
-                <a:cs typeface="Times New Roman" panose="02020603050405020304" pitchFamily="18" charset="0"/>
-              </a:rPr>
-              <a:t> are more likely to churn.</a:t>
+              <a:t>• </a:t>
+            </a:r>
+            <a:r>
+              <a:rPr lang="en-US" sz="1400" dirty="0">
+                <a:solidFill>
+                  <a:srgbClr val="000000"/>
+                </a:solidFill>
+                <a:latin typeface="Helvetica Neue"/>
+              </a:rPr>
+              <a:t>Customers who are </a:t>
+            </a:r>
+            <a:r>
+              <a:rPr lang="en-US" sz="1400" b="1" i="1" dirty="0">
+                <a:solidFill>
+                  <a:srgbClr val="000000"/>
+                </a:solidFill>
+                <a:latin typeface="Helvetica Neue"/>
+              </a:rPr>
+              <a:t>not senior Citizens </a:t>
+            </a:r>
+            <a:r>
+              <a:rPr lang="en-US" sz="1400" dirty="0">
+                <a:solidFill>
+                  <a:srgbClr val="000000"/>
+                </a:solidFill>
+                <a:latin typeface="Helvetica Neue"/>
+              </a:rPr>
+              <a:t>and  </a:t>
+            </a:r>
+          </a:p>
+          <a:p>
+            <a:r>
+              <a:rPr lang="en-US" sz="1400" dirty="0">
+                <a:solidFill>
+                  <a:srgbClr val="000000"/>
+                </a:solidFill>
+                <a:latin typeface="Helvetica Neue"/>
+              </a:rPr>
+              <a:t>   </a:t>
+            </a:r>
+            <a:r>
+              <a:rPr lang="en-US" sz="1400" b="1" i="1" dirty="0">
+                <a:solidFill>
+                  <a:srgbClr val="000000"/>
+                </a:solidFill>
+                <a:latin typeface="Helvetica Neue"/>
+              </a:rPr>
+              <a:t>do not have Partner </a:t>
+            </a:r>
+            <a:r>
+              <a:rPr lang="en-US" sz="1400" dirty="0">
+                <a:solidFill>
+                  <a:srgbClr val="000000"/>
+                </a:solidFill>
+                <a:latin typeface="Helvetica Neue"/>
+              </a:rPr>
+              <a:t>are </a:t>
+            </a:r>
+            <a:r>
+              <a:rPr lang="en-US" sz="1400" b="1" i="1" dirty="0">
+                <a:solidFill>
+                  <a:srgbClr val="000000"/>
+                </a:solidFill>
+                <a:latin typeface="Helvetica Neue"/>
+              </a:rPr>
+              <a:t>more Churners.</a:t>
             </a:r>
           </a:p>
         </p:txBody>
@@ -10415,52 +10481,113 @@
                 <a:latin typeface="Times New Roman" panose="02020603050405020304" pitchFamily="18" charset="0"/>
                 <a:cs typeface="Times New Roman" panose="02020603050405020304" pitchFamily="18" charset="0"/>
               </a:rPr>
-              <a:t>• Subscribers that are </a:t>
-            </a:r>
-            <a:r>
-              <a:rPr lang="en-US" sz="1600" b="1" i="1" dirty="0" err="1">
-                <a:latin typeface="Times New Roman" panose="02020603050405020304" pitchFamily="18" charset="0"/>
-                <a:cs typeface="Times New Roman" panose="02020603050405020304" pitchFamily="18" charset="0"/>
-              </a:rPr>
-              <a:t>streamingTV</a:t>
-            </a:r>
-            <a:r>
-              <a:rPr lang="en-US" sz="1600" b="1" i="1" dirty="0">
-                <a:latin typeface="Times New Roman" panose="02020603050405020304" pitchFamily="18" charset="0"/>
-                <a:cs typeface="Times New Roman" panose="02020603050405020304" pitchFamily="18" charset="0"/>
-              </a:rPr>
-              <a:t> or not </a:t>
-            </a:r>
-            <a:r>
-              <a:rPr lang="en-US" sz="1600" dirty="0">
-                <a:latin typeface="Times New Roman" panose="02020603050405020304" pitchFamily="18" charset="0"/>
-                <a:cs typeface="Times New Roman" panose="02020603050405020304" pitchFamily="18" charset="0"/>
-              </a:rPr>
-              <a:t>and are  </a:t>
-            </a:r>
-          </a:p>
-          <a:p>
-            <a:r>
-              <a:rPr lang="en-US" sz="1600" dirty="0">
-                <a:latin typeface="Times New Roman" panose="02020603050405020304" pitchFamily="18" charset="0"/>
-                <a:cs typeface="Times New Roman" panose="02020603050405020304" pitchFamily="18" charset="0"/>
+              <a:t>• </a:t>
+            </a:r>
+            <a:r>
+              <a:rPr lang="en-US" sz="1400" b="0" i="0" dirty="0">
+                <a:solidFill>
+                  <a:srgbClr val="000000"/>
+                </a:solidFill>
+                <a:effectLst/>
+                <a:latin typeface="Helvetica Neue"/>
+              </a:rPr>
+              <a:t>Customers who are </a:t>
+            </a:r>
+            <a:r>
+              <a:rPr lang="en-US" sz="1400" b="1" i="1" dirty="0">
+                <a:solidFill>
+                  <a:srgbClr val="000000"/>
+                </a:solidFill>
+                <a:effectLst/>
+                <a:latin typeface="Helvetica Neue"/>
+              </a:rPr>
+              <a:t>not Senior Citizens</a:t>
+            </a:r>
+            <a:r>
+              <a:rPr lang="en-US" sz="1400" b="0" i="1" dirty="0">
+                <a:solidFill>
+                  <a:srgbClr val="000000"/>
+                </a:solidFill>
+                <a:effectLst/>
+                <a:latin typeface="Helvetica Neue"/>
+              </a:rPr>
+              <a:t> </a:t>
+            </a:r>
+            <a:r>
+              <a:rPr lang="en-US" sz="1400" b="0" i="0" dirty="0">
+                <a:solidFill>
+                  <a:srgbClr val="000000"/>
+                </a:solidFill>
+                <a:effectLst/>
+                <a:latin typeface="Helvetica Neue"/>
+              </a:rPr>
+              <a:t>and </a:t>
+            </a:r>
+            <a:r>
+              <a:rPr lang="en-US" sz="1400" b="1" i="1" dirty="0">
+                <a:solidFill>
+                  <a:srgbClr val="000000"/>
+                </a:solidFill>
+                <a:effectLst/>
+                <a:latin typeface="Helvetica Neue"/>
+              </a:rPr>
+              <a:t>not </a:t>
+            </a:r>
+          </a:p>
+          <a:p>
+            <a:r>
+              <a:rPr lang="en-US" sz="1400" b="1" i="1" dirty="0">
+                <a:solidFill>
+                  <a:srgbClr val="000000"/>
+                </a:solidFill>
+                <a:latin typeface="Helvetica Neue"/>
               </a:rPr>
               <a:t>  </a:t>
             </a:r>
             <a:r>
-              <a:rPr lang="en-US" sz="1600" b="1" i="1" dirty="0">
-                <a:latin typeface="Times New Roman" panose="02020603050405020304" pitchFamily="18" charset="0"/>
-                <a:cs typeface="Times New Roman" panose="02020603050405020304" pitchFamily="18" charset="0"/>
-              </a:rPr>
-              <a:t>Non-senior citizen </a:t>
-            </a:r>
-            <a:r>
-              <a:rPr lang="en-US" sz="1600" dirty="0">
-                <a:latin typeface="Times New Roman" panose="02020603050405020304" pitchFamily="18" charset="0"/>
-                <a:cs typeface="Times New Roman" panose="02020603050405020304" pitchFamily="18" charset="0"/>
-              </a:rPr>
-              <a:t>are more likely to churn.</a:t>
-            </a:r>
+              <a:rPr lang="en-US" sz="1400" b="1" i="1" dirty="0" err="1">
+                <a:solidFill>
+                  <a:srgbClr val="000000"/>
+                </a:solidFill>
+                <a:effectLst/>
+                <a:latin typeface="Helvetica Neue"/>
+              </a:rPr>
+              <a:t>StreamingTV</a:t>
+            </a:r>
+            <a:r>
+              <a:rPr lang="en-US" sz="1400" b="0" i="1" dirty="0">
+                <a:solidFill>
+                  <a:srgbClr val="000000"/>
+                </a:solidFill>
+                <a:effectLst/>
+                <a:latin typeface="Helvetica Neue"/>
+              </a:rPr>
+              <a:t> </a:t>
+            </a:r>
+            <a:r>
+              <a:rPr lang="en-US" sz="1400" b="0" i="0" dirty="0">
+                <a:solidFill>
+                  <a:srgbClr val="000000"/>
+                </a:solidFill>
+                <a:effectLst/>
+                <a:latin typeface="Helvetica Neue"/>
+              </a:rPr>
+              <a:t>are </a:t>
+            </a:r>
+            <a:r>
+              <a:rPr lang="en-US" sz="1400" b="1" i="1" dirty="0">
+                <a:solidFill>
+                  <a:srgbClr val="000000"/>
+                </a:solidFill>
+                <a:effectLst/>
+                <a:latin typeface="Helvetica Neue"/>
+              </a:rPr>
+              <a:t>more churners.</a:t>
+            </a:r>
+            <a:endParaRPr lang="en-US" sz="1600" i="1" dirty="0">
+              <a:latin typeface="Times New Roman" panose="02020603050405020304" pitchFamily="18" charset="0"/>
+              <a:cs typeface="Times New Roman" panose="02020603050405020304" pitchFamily="18" charset="0"/>
+            </a:endParaRPr>
           </a:p>
         </p:txBody>
       </p:sp>
@@ -10539,7 +10666,7 @@
         <p:spPr>
           <a:xfrm>
             <a:off x="4969397" y="3930961"/>
-            <a:ext cx="4211116" cy="830997"/>
+            <a:ext cx="4211116" cy="1015663"/>
           </a:xfrm>
           <a:prstGeom prst="rect">
             <a:avLst/>
@@ -10575,45 +10702,104 @@
                 <a:latin typeface="Times New Roman" panose="02020603050405020304" pitchFamily="18" charset="0"/>
                 <a:cs typeface="Times New Roman" panose="02020603050405020304" pitchFamily="18" charset="0"/>
               </a:rPr>
-              <a:t>• Subscribers with </a:t>
-            </a:r>
-            <a:r>
-              <a:rPr lang="en-US" sz="1600" b="1" i="1" dirty="0">
-                <a:latin typeface="Times New Roman" panose="02020603050405020304" pitchFamily="18" charset="0"/>
-                <a:cs typeface="Times New Roman" panose="02020603050405020304" pitchFamily="18" charset="0"/>
-              </a:rPr>
-              <a:t>month-to-month</a:t>
-            </a:r>
-            <a:r>
-              <a:rPr lang="en-US" sz="1600" dirty="0">
-                <a:latin typeface="Times New Roman" panose="02020603050405020304" pitchFamily="18" charset="0"/>
-                <a:cs typeface="Times New Roman" panose="02020603050405020304" pitchFamily="18" charset="0"/>
-              </a:rPr>
-              <a:t> contract and </a:t>
-            </a:r>
-          </a:p>
-          <a:p>
-            <a:r>
-              <a:rPr lang="en-US" sz="1600" dirty="0">
-                <a:latin typeface="Times New Roman" panose="02020603050405020304" pitchFamily="18" charset="0"/>
-                <a:cs typeface="Times New Roman" panose="02020603050405020304" pitchFamily="18" charset="0"/>
-              </a:rPr>
-              <a:t>  are </a:t>
-            </a:r>
-            <a:r>
-              <a:rPr lang="en-US" sz="1600" b="1" i="1" dirty="0">
-                <a:latin typeface="Times New Roman" panose="02020603050405020304" pitchFamily="18" charset="0"/>
-                <a:cs typeface="Times New Roman" panose="02020603050405020304" pitchFamily="18" charset="0"/>
-              </a:rPr>
-              <a:t>Non senior citizen </a:t>
-            </a:r>
-            <a:r>
-              <a:rPr lang="en-US" sz="1600" dirty="0">
-                <a:latin typeface="Times New Roman" panose="02020603050405020304" pitchFamily="18" charset="0"/>
-                <a:cs typeface="Times New Roman" panose="02020603050405020304" pitchFamily="18" charset="0"/>
-              </a:rPr>
-              <a:t>are more likely to churn.</a:t>
-            </a:r>
+              <a:t>• </a:t>
+            </a:r>
+            <a:r>
+              <a:rPr lang="en-US" sz="1400" b="0" i="0" dirty="0">
+                <a:solidFill>
+                  <a:srgbClr val="000000"/>
+                </a:solidFill>
+                <a:effectLst/>
+                <a:latin typeface="Helvetica Neue"/>
+              </a:rPr>
+              <a:t>Customers who are </a:t>
+            </a:r>
+            <a:r>
+              <a:rPr lang="en-US" sz="1400" b="1" i="1" dirty="0">
+                <a:solidFill>
+                  <a:srgbClr val="000000"/>
+                </a:solidFill>
+                <a:effectLst/>
+                <a:latin typeface="Helvetica Neue"/>
+              </a:rPr>
+              <a:t>not Senior Citizens</a:t>
+            </a:r>
+            <a:r>
+              <a:rPr lang="en-US" sz="1400" b="0" i="1" dirty="0">
+                <a:solidFill>
+                  <a:srgbClr val="000000"/>
+                </a:solidFill>
+                <a:effectLst/>
+                <a:latin typeface="Helvetica Neue"/>
+              </a:rPr>
+              <a:t> </a:t>
+            </a:r>
+            <a:r>
+              <a:rPr lang="en-US" sz="1400" b="0" i="0" dirty="0">
+                <a:solidFill>
+                  <a:srgbClr val="000000"/>
+                </a:solidFill>
+                <a:effectLst/>
+                <a:latin typeface="Helvetica Neue"/>
+              </a:rPr>
+              <a:t>and </a:t>
+            </a:r>
+          </a:p>
+          <a:p>
+            <a:r>
+              <a:rPr lang="en-US" sz="1400" dirty="0">
+                <a:solidFill>
+                  <a:srgbClr val="000000"/>
+                </a:solidFill>
+                <a:latin typeface="Helvetica Neue"/>
+              </a:rPr>
+              <a:t>   </a:t>
+            </a:r>
+            <a:r>
+              <a:rPr lang="en-US" sz="1400" b="0" i="0" dirty="0">
+                <a:solidFill>
+                  <a:srgbClr val="000000"/>
+                </a:solidFill>
+                <a:effectLst/>
+                <a:latin typeface="Helvetica Neue"/>
+              </a:rPr>
+              <a:t>having </a:t>
+            </a:r>
+            <a:r>
+              <a:rPr lang="en-US" sz="1400" b="1" i="1" dirty="0">
+                <a:solidFill>
+                  <a:srgbClr val="000000"/>
+                </a:solidFill>
+                <a:effectLst/>
+                <a:latin typeface="Helvetica Neue"/>
+              </a:rPr>
+              <a:t>month-to-month contract are more  </a:t>
+            </a:r>
+          </a:p>
+          <a:p>
+            <a:r>
+              <a:rPr lang="en-US" sz="1400" b="1" i="1" dirty="0">
+                <a:solidFill>
+                  <a:srgbClr val="000000"/>
+                </a:solidFill>
+                <a:latin typeface="Helvetica Neue"/>
+              </a:rPr>
+              <a:t>   </a:t>
+            </a:r>
+            <a:r>
+              <a:rPr lang="en-US" sz="1400" b="1" i="1" dirty="0">
+                <a:solidFill>
+                  <a:srgbClr val="000000"/>
+                </a:solidFill>
+                <a:effectLst/>
+                <a:latin typeface="Helvetica Neue"/>
+              </a:rPr>
+              <a:t>Churners.</a:t>
+            </a:r>
+            <a:endParaRPr lang="en-US" sz="1600" i="1" dirty="0">
+              <a:latin typeface="Times New Roman" panose="02020603050405020304" pitchFamily="18" charset="0"/>
+              <a:cs typeface="Times New Roman" panose="02020603050405020304" pitchFamily="18" charset="0"/>
+            </a:endParaRPr>
           </a:p>
         </p:txBody>
       </p:sp>
@@ -10956,45 +11142,83 @@
                 <a:latin typeface="Times New Roman" panose="02020603050405020304" pitchFamily="18" charset="0"/>
                 <a:cs typeface="Times New Roman" panose="02020603050405020304" pitchFamily="18" charset="0"/>
               </a:rPr>
-              <a:t>• Subscribers that opted for </a:t>
-            </a:r>
-            <a:r>
-              <a:rPr lang="en-US" sz="1600" b="1" i="1" dirty="0">
-                <a:latin typeface="Times New Roman" panose="02020603050405020304" pitchFamily="18" charset="0"/>
-                <a:cs typeface="Times New Roman" panose="02020603050405020304" pitchFamily="18" charset="0"/>
-              </a:rPr>
-              <a:t>electronic-check</a:t>
-            </a:r>
-            <a:r>
-              <a:rPr lang="en-US" sz="1600" dirty="0">
-                <a:latin typeface="Times New Roman" panose="02020603050405020304" pitchFamily="18" charset="0"/>
-                <a:cs typeface="Times New Roman" panose="02020603050405020304" pitchFamily="18" charset="0"/>
-              </a:rPr>
-              <a:t> payment method and </a:t>
-            </a:r>
-            <a:r>
-              <a:rPr lang="en-US" sz="1600" b="1" i="1" dirty="0">
-                <a:latin typeface="Times New Roman" panose="02020603050405020304" pitchFamily="18" charset="0"/>
-                <a:cs typeface="Times New Roman" panose="02020603050405020304" pitchFamily="18" charset="0"/>
-              </a:rPr>
-              <a:t>aren’t </a:t>
-            </a:r>
-          </a:p>
-          <a:p>
-            <a:r>
-              <a:rPr lang="en-US" sz="1600" b="1" i="1" dirty="0">
-                <a:latin typeface="Times New Roman" panose="02020603050405020304" pitchFamily="18" charset="0"/>
-                <a:cs typeface="Times New Roman" panose="02020603050405020304" pitchFamily="18" charset="0"/>
-              </a:rPr>
-              <a:t>  senior citizen </a:t>
-            </a:r>
-            <a:r>
-              <a:rPr lang="en-US" sz="1600" dirty="0">
-                <a:latin typeface="Times New Roman" panose="02020603050405020304" pitchFamily="18" charset="0"/>
-                <a:cs typeface="Times New Roman" panose="02020603050405020304" pitchFamily="18" charset="0"/>
-              </a:rPr>
-              <a:t>are more likely to churn.</a:t>
-            </a:r>
+              <a:t>• </a:t>
+            </a:r>
+            <a:r>
+              <a:rPr lang="en-US" sz="1400" b="0" i="0" dirty="0">
+                <a:solidFill>
+                  <a:srgbClr val="000000"/>
+                </a:solidFill>
+                <a:effectLst/>
+                <a:latin typeface="Helvetica Neue"/>
+              </a:rPr>
+              <a:t>Customers who are </a:t>
+            </a:r>
+            <a:r>
+              <a:rPr lang="en-US" sz="1400" b="1" i="1" dirty="0">
+                <a:solidFill>
+                  <a:srgbClr val="000000"/>
+                </a:solidFill>
+                <a:effectLst/>
+                <a:latin typeface="Helvetica Neue"/>
+              </a:rPr>
+              <a:t>not Senior Citizens</a:t>
+            </a:r>
+            <a:r>
+              <a:rPr lang="en-US" sz="1400" b="0" i="1" dirty="0">
+                <a:solidFill>
+                  <a:srgbClr val="000000"/>
+                </a:solidFill>
+                <a:effectLst/>
+                <a:latin typeface="Helvetica Neue"/>
+              </a:rPr>
+              <a:t> </a:t>
+            </a:r>
+            <a:r>
+              <a:rPr lang="en-US" sz="1400" b="0" i="0" dirty="0">
+                <a:solidFill>
+                  <a:srgbClr val="000000"/>
+                </a:solidFill>
+                <a:effectLst/>
+                <a:latin typeface="Helvetica Neue"/>
+              </a:rPr>
+              <a:t>and opted for </a:t>
+            </a:r>
+            <a:r>
+              <a:rPr lang="en-US" sz="1400" b="1" i="1" dirty="0">
+                <a:solidFill>
+                  <a:srgbClr val="000000"/>
+                </a:solidFill>
+                <a:effectLst/>
+                <a:latin typeface="Helvetica Neue"/>
+              </a:rPr>
+              <a:t>Electronic check as a </a:t>
+            </a:r>
+          </a:p>
+          <a:p>
+            <a:r>
+              <a:rPr lang="en-US" sz="1400" b="1" i="1" dirty="0">
+                <a:solidFill>
+                  <a:srgbClr val="000000"/>
+                </a:solidFill>
+                <a:latin typeface="Helvetica Neue"/>
+              </a:rPr>
+              <a:t>   </a:t>
+            </a:r>
+            <a:r>
+              <a:rPr lang="en-US" sz="1400" b="1" i="1" dirty="0">
+                <a:solidFill>
+                  <a:srgbClr val="000000"/>
+                </a:solidFill>
+                <a:effectLst/>
+                <a:latin typeface="Helvetica Neue"/>
+              </a:rPr>
+              <a:t>Payment method are more Churners.</a:t>
+            </a:r>
+            <a:endParaRPr lang="en-US" sz="1600" i="1" dirty="0">
+              <a:latin typeface="Times New Roman" panose="02020603050405020304" pitchFamily="18" charset="0"/>
+              <a:cs typeface="Times New Roman" panose="02020603050405020304" pitchFamily="18" charset="0"/>
+            </a:endParaRPr>
           </a:p>
         </p:txBody>
       </p:sp>
@@ -11359,152 +11583,163 @@
                 <a:latin typeface="Times New Roman" panose="02020603050405020304" pitchFamily="18" charset="0"/>
                 <a:cs typeface="Times New Roman" panose="02020603050405020304" pitchFamily="18" charset="0"/>
               </a:rPr>
-              <a:t>• Both </a:t>
+              <a:t>• </a:t>
+            </a:r>
+            <a:r>
+              <a:rPr lang="en-US" sz="1400" b="0" i="0" dirty="0">
+                <a:solidFill>
+                  <a:srgbClr val="000000"/>
+                </a:solidFill>
+                <a:effectLst/>
+                <a:latin typeface="Helvetica Neue"/>
+              </a:rPr>
+              <a:t>Customers who </a:t>
+            </a:r>
+            <a:r>
+              <a:rPr lang="en-US" sz="1400" b="1" i="1" dirty="0">
+                <a:solidFill>
+                  <a:srgbClr val="000000"/>
+                </a:solidFill>
+                <a:effectLst/>
+                <a:latin typeface="Helvetica Neue"/>
+              </a:rPr>
+              <a:t>do not have Partners are more </a:t>
+            </a:r>
+          </a:p>
+          <a:p>
+            <a:r>
+              <a:rPr lang="en-US" sz="1400" b="1" i="1" dirty="0">
+                <a:solidFill>
+                  <a:srgbClr val="000000"/>
+                </a:solidFill>
+                <a:latin typeface="Helvetica Neue"/>
+              </a:rPr>
+              <a:t>  </a:t>
+            </a:r>
+            <a:r>
+              <a:rPr lang="en-US" sz="1400" b="1" i="1" dirty="0">
+                <a:solidFill>
+                  <a:srgbClr val="000000"/>
+                </a:solidFill>
+                <a:effectLst/>
+                <a:latin typeface="Helvetica Neue"/>
+              </a:rPr>
+              <a:t>Churners.</a:t>
+            </a:r>
+            <a:endParaRPr lang="en-US" sz="1600" i="1" dirty="0">
+              <a:latin typeface="Times New Roman" panose="02020603050405020304" pitchFamily="18" charset="0"/>
+              <a:cs typeface="Times New Roman" panose="02020603050405020304" pitchFamily="18" charset="0"/>
+            </a:endParaRPr>
+          </a:p>
+        </p:txBody>
+      </p:sp>
+      <p:sp>
+        <p:nvSpPr>
+          <p:cNvPr id="9" name="TextBox 8">
+            <a:extLst>
+              <a:ext uri="{FF2B5EF4-FFF2-40B4-BE49-F238E27FC236}">
+                <a16:creationId xmlns:a16="http://schemas.microsoft.com/office/drawing/2014/main" id="{DC248023-B582-8A2A-A6CD-2A074E250D45}"/>
+              </a:ext>
+            </a:extLst>
+          </p:cNvPr>
+          <p:cNvSpPr txBox="1"/>
+          <p:nvPr/>
+        </p:nvSpPr>
+        <p:spPr>
+          <a:xfrm>
+            <a:off x="4969397" y="3930961"/>
+            <a:ext cx="4211116" cy="830997"/>
+          </a:xfrm>
+          <a:prstGeom prst="rect">
+            <a:avLst/>
+          </a:prstGeom>
+          <a:noFill/>
+        </p:spPr>
+        <p:txBody>
+          <a:bodyPr wrap="square" rtlCol="0">
+            <a:spAutoFit/>
+          </a:bodyPr>
+          <a:lstStyle/>
+          <a:p>
+            <a:r>
+              <a:rPr lang="en-US" sz="1600" b="1" dirty="0"/>
+              <a:t>Variable</a:t>
+            </a:r>
+            <a:r>
+              <a:rPr lang="en-US" sz="1600" dirty="0"/>
+              <a:t> : </a:t>
+            </a:r>
+            <a:r>
+              <a:rPr lang="en-US" sz="1600" dirty="0" err="1"/>
+              <a:t>StreamingTV</a:t>
+            </a:r>
+            <a:r>
+              <a:rPr lang="en-US" sz="1600" dirty="0"/>
+              <a:t>    </a:t>
+            </a:r>
+            <a:r>
+              <a:rPr lang="en-US" sz="1600" b="1" dirty="0"/>
+              <a:t>Hue</a:t>
+            </a:r>
+            <a:r>
+              <a:rPr lang="en-US" sz="1600" dirty="0"/>
+              <a:t> : gender</a:t>
+            </a:r>
+          </a:p>
+          <a:p>
+            <a:r>
+              <a:rPr lang="en-US" sz="1600" dirty="0">
+                <a:latin typeface="Times New Roman" panose="02020603050405020304" pitchFamily="18" charset="0"/>
+                <a:cs typeface="Times New Roman" panose="02020603050405020304" pitchFamily="18" charset="0"/>
+              </a:rPr>
+              <a:t>• </a:t>
+            </a:r>
+            <a:r>
+              <a:rPr lang="en-US" sz="1600" b="0" i="0" dirty="0">
+                <a:solidFill>
+                  <a:srgbClr val="000000"/>
+                </a:solidFill>
+                <a:effectLst/>
+                <a:latin typeface="Helvetica Neue"/>
+              </a:rPr>
+              <a:t>Customers </a:t>
+            </a:r>
+            <a:r>
+              <a:rPr lang="en-US" sz="1600" dirty="0">
+                <a:latin typeface="Times New Roman" panose="02020603050405020304" pitchFamily="18" charset="0"/>
+                <a:cs typeface="Times New Roman" panose="02020603050405020304" pitchFamily="18" charset="0"/>
+              </a:rPr>
+              <a:t>who are  </a:t>
+            </a:r>
+            <a:r>
+              <a:rPr lang="en-US" sz="1600" b="1" i="1" dirty="0" err="1">
+                <a:latin typeface="Times New Roman" panose="02020603050405020304" pitchFamily="18" charset="0"/>
+                <a:cs typeface="Times New Roman" panose="02020603050405020304" pitchFamily="18" charset="0"/>
+              </a:rPr>
+              <a:t>streamingTV</a:t>
             </a:r>
             <a:r>
               <a:rPr lang="en-US" sz="1600" b="1" i="1" dirty="0">
                 <a:latin typeface="Times New Roman" panose="02020603050405020304" pitchFamily="18" charset="0"/>
                 <a:cs typeface="Times New Roman" panose="02020603050405020304" pitchFamily="18" charset="0"/>
               </a:rPr>
-              <a:t>male &amp; female </a:t>
+              <a:t> or not </a:t>
             </a:r>
             <a:r>
               <a:rPr lang="en-US" sz="1600" dirty="0">
                 <a:latin typeface="Times New Roman" panose="02020603050405020304" pitchFamily="18" charset="0"/>
                 <a:cs typeface="Times New Roman" panose="02020603050405020304" pitchFamily="18" charset="0"/>
               </a:rPr>
-              <a:t>Subscribers that </a:t>
-            </a:r>
-            <a:r>
-              <a:rPr lang="en-US" sz="1600" b="1" i="1" dirty="0">
-                <a:latin typeface="Times New Roman" panose="02020603050405020304" pitchFamily="18" charset="0"/>
-                <a:cs typeface="Times New Roman" panose="02020603050405020304" pitchFamily="18" charset="0"/>
-              </a:rPr>
-              <a:t>don’t have </a:t>
-            </a:r>
-          </a:p>
-          <a:p>
-            <a:r>
-              <a:rPr lang="en-US" sz="1600" b="1" i="1" dirty="0">
-                <a:latin typeface="Times New Roman" panose="02020603050405020304" pitchFamily="18" charset="0"/>
-                <a:cs typeface="Times New Roman" panose="02020603050405020304" pitchFamily="18" charset="0"/>
-              </a:rPr>
-              <a:t>  Partner</a:t>
-            </a:r>
+              <a:t>are </a:t>
+            </a:r>
+          </a:p>
+          <a:p>
             <a:r>
               <a:rPr lang="en-US" sz="1600" dirty="0">
                 <a:latin typeface="Times New Roman" panose="02020603050405020304" pitchFamily="18" charset="0"/>
                 <a:cs typeface="Times New Roman" panose="02020603050405020304" pitchFamily="18" charset="0"/>
               </a:rPr>
-              <a:t> are more likely to churn.</a:t>
-            </a:r>
-          </a:p>
-        </p:txBody>
-      </p:sp>
-      <p:sp>
-        <p:nvSpPr>
-          <p:cNvPr id="9" name="TextBox 8">
-            <a:extLst>
-              <a:ext uri="{FF2B5EF4-FFF2-40B4-BE49-F238E27FC236}">
-                <a16:creationId xmlns:a16="http://schemas.microsoft.com/office/drawing/2014/main" id="{DC248023-B582-8A2A-A6CD-2A074E250D45}"/>
-              </a:ext>
-            </a:extLst>
-          </p:cNvPr>
-          <p:cNvSpPr txBox="1"/>
-          <p:nvPr/>
-        </p:nvSpPr>
-        <p:spPr>
-          <a:xfrm>
-            <a:off x="4969397" y="3930961"/>
-            <a:ext cx="4211116" cy="830997"/>
-          </a:xfrm>
-          <a:prstGeom prst="rect">
-            <a:avLst/>
-          </a:prstGeom>
-          <a:noFill/>
-        </p:spPr>
-        <p:txBody>
-          <a:bodyPr wrap="square" rtlCol="0">
-            <a:spAutoFit/>
-          </a:bodyPr>
-          <a:lstStyle/>
-          <a:p>
-            <a:r>
-              <a:rPr lang="en-US" sz="1600" b="1" dirty="0"/>
-              <a:t>Variable</a:t>
-            </a:r>
-            <a:r>
-              <a:rPr lang="en-US" sz="1600" dirty="0"/>
-              <a:t> : </a:t>
-            </a:r>
-            <a:r>
-              <a:rPr lang="en-US" sz="1600" dirty="0" err="1"/>
-              <a:t>StreamingTV</a:t>
-            </a:r>
-            <a:r>
-              <a:rPr lang="en-US" sz="1600" dirty="0"/>
-              <a:t>    </a:t>
-            </a:r>
-            <a:r>
-              <a:rPr lang="en-US" sz="1600" b="1" dirty="0"/>
-              <a:t>Hue</a:t>
-            </a:r>
-            <a:r>
-              <a:rPr lang="en-US" sz="1600" dirty="0"/>
-              <a:t> : gender</a:t>
-            </a:r>
-          </a:p>
-          <a:p>
-            <a:r>
-              <a:rPr lang="en-US" sz="1600" dirty="0">
-                <a:latin typeface="Times New Roman" panose="02020603050405020304" pitchFamily="18" charset="0"/>
-                <a:cs typeface="Times New Roman" panose="02020603050405020304" pitchFamily="18" charset="0"/>
-              </a:rPr>
-              <a:t>• Both </a:t>
-            </a:r>
-            <a:r>
-              <a:rPr lang="en-US" sz="1600" b="1" i="1" dirty="0">
-                <a:latin typeface="Times New Roman" panose="02020603050405020304" pitchFamily="18" charset="0"/>
-                <a:cs typeface="Times New Roman" panose="02020603050405020304" pitchFamily="18" charset="0"/>
-              </a:rPr>
-              <a:t>male &amp; female </a:t>
-            </a:r>
-            <a:r>
-              <a:rPr lang="en-US" sz="1600" dirty="0">
-                <a:latin typeface="Times New Roman" panose="02020603050405020304" pitchFamily="18" charset="0"/>
-                <a:cs typeface="Times New Roman" panose="02020603050405020304" pitchFamily="18" charset="0"/>
-              </a:rPr>
-              <a:t>Subscribers that are </a:t>
-            </a:r>
-          </a:p>
-          <a:p>
-            <a:r>
-              <a:rPr lang="en-US" sz="1600" dirty="0">
-                <a:latin typeface="Times New Roman" panose="02020603050405020304" pitchFamily="18" charset="0"/>
-                <a:cs typeface="Times New Roman" panose="02020603050405020304" pitchFamily="18" charset="0"/>
-              </a:rPr>
-              <a:t>  </a:t>
-            </a:r>
-            <a:r>
-              <a:rPr lang="en-US" sz="1600" b="1" i="1" dirty="0" err="1">
-                <a:latin typeface="Times New Roman" panose="02020603050405020304" pitchFamily="18" charset="0"/>
-                <a:cs typeface="Times New Roman" panose="02020603050405020304" pitchFamily="18" charset="0"/>
-              </a:rPr>
-              <a:t>streamingTV</a:t>
-            </a:r>
-            <a:r>
-              <a:rPr lang="en-US" sz="1600" b="1" i="1" dirty="0">
-                <a:latin typeface="Times New Roman" panose="02020603050405020304" pitchFamily="18" charset="0"/>
-                <a:cs typeface="Times New Roman" panose="02020603050405020304" pitchFamily="18" charset="0"/>
-              </a:rPr>
-              <a:t> or not </a:t>
-            </a:r>
-            <a:r>
-              <a:rPr lang="en-US" sz="1600" dirty="0">
-                <a:latin typeface="Times New Roman" panose="02020603050405020304" pitchFamily="18" charset="0"/>
-                <a:cs typeface="Times New Roman" panose="02020603050405020304" pitchFamily="18" charset="0"/>
-              </a:rPr>
-              <a:t>are equally likely to churn.</a:t>
+              <a:t>  equally likely to churn.</a:t>
             </a:r>
           </a:p>
         </p:txBody>
@@ -11900,155 +12135,162 @@
                 <a:latin typeface="Times New Roman" panose="02020603050405020304" pitchFamily="18" charset="0"/>
                 <a:cs typeface="Times New Roman" panose="02020603050405020304" pitchFamily="18" charset="0"/>
               </a:rPr>
-              <a:t>• Both </a:t>
-            </a:r>
-            <a:r>
-              <a:rPr lang="en-US" sz="1600" b="1" i="1" dirty="0">
-                <a:latin typeface="Times New Roman" panose="02020603050405020304" pitchFamily="18" charset="0"/>
-                <a:cs typeface="Times New Roman" panose="02020603050405020304" pitchFamily="18" charset="0"/>
-              </a:rPr>
-              <a:t>male &amp; female </a:t>
-            </a:r>
+              <a:t>• </a:t>
+            </a:r>
+            <a:r>
+              <a:rPr lang="en-US" sz="1400" b="0" i="0" dirty="0">
+                <a:solidFill>
+                  <a:srgbClr val="000000"/>
+                </a:solidFill>
+                <a:effectLst/>
+                <a:latin typeface="Helvetica Neue"/>
+              </a:rPr>
+              <a:t>Customers opted for </a:t>
+            </a:r>
+            <a:r>
+              <a:rPr lang="en-US" sz="1400" b="1" i="1" dirty="0">
+                <a:solidFill>
+                  <a:srgbClr val="000000"/>
+                </a:solidFill>
+                <a:effectLst/>
+                <a:latin typeface="Helvetica Neue"/>
+              </a:rPr>
+              <a:t>month-to-month contract </a:t>
+            </a:r>
+          </a:p>
+          <a:p>
+            <a:r>
+              <a:rPr lang="en-US" sz="1400" b="1" i="1" dirty="0">
+                <a:solidFill>
+                  <a:srgbClr val="000000"/>
+                </a:solidFill>
+                <a:latin typeface="Helvetica Neue"/>
+              </a:rPr>
+              <a:t>   </a:t>
+            </a:r>
+            <a:r>
+              <a:rPr lang="en-US" sz="1400" b="1" i="1" dirty="0">
+                <a:solidFill>
+                  <a:srgbClr val="000000"/>
+                </a:solidFill>
+                <a:effectLst/>
+                <a:latin typeface="Helvetica Neue"/>
+              </a:rPr>
+              <a:t>are more churners.</a:t>
+            </a:r>
+            <a:endParaRPr lang="en-US" sz="1600" i="1" dirty="0">
+              <a:latin typeface="Times New Roman" panose="02020603050405020304" pitchFamily="18" charset="0"/>
+              <a:cs typeface="Times New Roman" panose="02020603050405020304" pitchFamily="18" charset="0"/>
+            </a:endParaRPr>
+          </a:p>
+        </p:txBody>
+      </p:sp>
+      <p:sp>
+        <p:nvSpPr>
+          <p:cNvPr id="7" name="TextBox 6">
+            <a:extLst>
+              <a:ext uri="{FF2B5EF4-FFF2-40B4-BE49-F238E27FC236}">
+                <a16:creationId xmlns:a16="http://schemas.microsoft.com/office/drawing/2014/main" id="{B0D6681F-3EB8-1114-EFAB-FD6A6C6A28DE}"/>
+              </a:ext>
+            </a:extLst>
+          </p:cNvPr>
+          <p:cNvSpPr txBox="1"/>
+          <p:nvPr/>
+        </p:nvSpPr>
+        <p:spPr>
+          <a:xfrm>
+            <a:off x="4969397" y="3930961"/>
+            <a:ext cx="4211116" cy="800219"/>
+          </a:xfrm>
+          <a:prstGeom prst="rect">
+            <a:avLst/>
+          </a:prstGeom>
+          <a:noFill/>
+        </p:spPr>
+        <p:txBody>
+          <a:bodyPr wrap="square" rtlCol="0">
+            <a:spAutoFit/>
+          </a:bodyPr>
+          <a:lstStyle/>
+          <a:p>
+            <a:r>
+              <a:rPr lang="en-US" sz="1600" b="1" dirty="0"/>
+              <a:t>Variable</a:t>
+            </a:r>
+            <a:r>
+              <a:rPr lang="en-US" sz="1600" dirty="0"/>
+              <a:t> : </a:t>
+            </a:r>
+            <a:r>
+              <a:rPr lang="en-US" sz="1600" dirty="0" err="1"/>
+              <a:t>PaymentMethod</a:t>
+            </a:r>
+            <a:r>
+              <a:rPr lang="en-US" sz="1600" dirty="0"/>
+              <a:t>    </a:t>
+            </a:r>
+            <a:r>
+              <a:rPr lang="en-US" sz="1600" b="1" dirty="0"/>
+              <a:t>Hue</a:t>
+            </a:r>
+            <a:r>
+              <a:rPr lang="en-US" sz="1600" dirty="0"/>
+              <a:t> : gender</a:t>
+            </a:r>
+          </a:p>
+          <a:p>
             <a:r>
               <a:rPr lang="en-US" sz="1600" dirty="0">
                 <a:latin typeface="Times New Roman" panose="02020603050405020304" pitchFamily="18" charset="0"/>
                 <a:cs typeface="Times New Roman" panose="02020603050405020304" pitchFamily="18" charset="0"/>
               </a:rPr>
-              <a:t>Subscribers with </a:t>
-            </a:r>
-            <a:r>
-              <a:rPr lang="en-US" sz="1600" b="1" i="1" dirty="0">
-                <a:latin typeface="Times New Roman" panose="02020603050405020304" pitchFamily="18" charset="0"/>
-                <a:cs typeface="Times New Roman" panose="02020603050405020304" pitchFamily="18" charset="0"/>
-              </a:rPr>
-              <a:t>month-to- </a:t>
-            </a:r>
-          </a:p>
-          <a:p>
-            <a:r>
-              <a:rPr lang="en-US" sz="1600" b="1" i="1" dirty="0">
-                <a:latin typeface="Times New Roman" panose="02020603050405020304" pitchFamily="18" charset="0"/>
-                <a:cs typeface="Times New Roman" panose="02020603050405020304" pitchFamily="18" charset="0"/>
-              </a:rPr>
-              <a:t>  month</a:t>
-            </a:r>
-            <a:r>
-              <a:rPr lang="en-US" sz="1600" dirty="0">
-                <a:latin typeface="Times New Roman" panose="02020603050405020304" pitchFamily="18" charset="0"/>
-                <a:cs typeface="Times New Roman" panose="02020603050405020304" pitchFamily="18" charset="0"/>
-              </a:rPr>
-              <a:t> contract are more likely to churn.</a:t>
-            </a:r>
-          </a:p>
-        </p:txBody>
-      </p:sp>
-      <p:sp>
-        <p:nvSpPr>
-          <p:cNvPr id="7" name="TextBox 6">
-            <a:extLst>
-              <a:ext uri="{FF2B5EF4-FFF2-40B4-BE49-F238E27FC236}">
-                <a16:creationId xmlns:a16="http://schemas.microsoft.com/office/drawing/2014/main" id="{B0D6681F-3EB8-1114-EFAB-FD6A6C6A28DE}"/>
-              </a:ext>
-            </a:extLst>
-          </p:cNvPr>
-          <p:cNvSpPr txBox="1"/>
-          <p:nvPr/>
-        </p:nvSpPr>
-        <p:spPr>
-          <a:xfrm>
-            <a:off x="4969397" y="3930961"/>
-            <a:ext cx="4211116" cy="1077218"/>
-          </a:xfrm>
-          <a:prstGeom prst="rect">
-            <a:avLst/>
-          </a:prstGeom>
-          <a:noFill/>
-        </p:spPr>
-        <p:txBody>
-          <a:bodyPr wrap="square" rtlCol="0">
-            <a:spAutoFit/>
-          </a:bodyPr>
-          <a:lstStyle/>
-          <a:p>
-            <a:r>
-              <a:rPr lang="en-US" sz="1600" b="1" dirty="0"/>
-              <a:t>Variable</a:t>
-            </a:r>
-            <a:r>
-              <a:rPr lang="en-US" sz="1600" dirty="0"/>
-              <a:t> : </a:t>
-            </a:r>
-            <a:r>
-              <a:rPr lang="en-US" sz="1600" dirty="0" err="1"/>
-              <a:t>PaymentMethod</a:t>
-            </a:r>
-            <a:r>
-              <a:rPr lang="en-US" sz="1600" dirty="0"/>
-              <a:t>    </a:t>
-            </a:r>
-            <a:r>
-              <a:rPr lang="en-US" sz="1600" b="1" dirty="0"/>
-              <a:t>Hue</a:t>
-            </a:r>
-            <a:r>
-              <a:rPr lang="en-US" sz="1600" dirty="0"/>
-              <a:t> : gender</a:t>
-            </a:r>
-          </a:p>
-          <a:p>
-            <a:r>
-              <a:rPr lang="en-US" sz="1600" dirty="0">
-                <a:latin typeface="Times New Roman" panose="02020603050405020304" pitchFamily="18" charset="0"/>
-                <a:cs typeface="Times New Roman" panose="02020603050405020304" pitchFamily="18" charset="0"/>
-              </a:rPr>
-              <a:t>• Both </a:t>
-            </a:r>
-            <a:r>
-              <a:rPr lang="en-US" sz="1600" b="1" i="1" dirty="0">
-                <a:latin typeface="Times New Roman" panose="02020603050405020304" pitchFamily="18" charset="0"/>
-                <a:cs typeface="Times New Roman" panose="02020603050405020304" pitchFamily="18" charset="0"/>
-              </a:rPr>
-              <a:t>male &amp; female </a:t>
-            </a:r>
-            <a:r>
-              <a:rPr lang="en-US" sz="1600" dirty="0">
-                <a:latin typeface="Times New Roman" panose="02020603050405020304" pitchFamily="18" charset="0"/>
-                <a:cs typeface="Times New Roman" panose="02020603050405020304" pitchFamily="18" charset="0"/>
-              </a:rPr>
-              <a:t>Subscribers with </a:t>
-            </a:r>
-          </a:p>
-          <a:p>
-            <a:r>
-              <a:rPr lang="en-US" sz="1600" dirty="0">
-                <a:latin typeface="Times New Roman" panose="02020603050405020304" pitchFamily="18" charset="0"/>
-                <a:cs typeface="Times New Roman" panose="02020603050405020304" pitchFamily="18" charset="0"/>
-              </a:rPr>
-              <a:t>  </a:t>
-            </a:r>
-            <a:r>
-              <a:rPr lang="en-US" sz="1600" b="1" i="1" dirty="0">
-                <a:latin typeface="Times New Roman" panose="02020603050405020304" pitchFamily="18" charset="0"/>
-                <a:cs typeface="Times New Roman" panose="02020603050405020304" pitchFamily="18" charset="0"/>
-              </a:rPr>
-              <a:t>Electronic-check</a:t>
-            </a:r>
-            <a:r>
-              <a:rPr lang="en-US" sz="1600" dirty="0">
-                <a:latin typeface="Times New Roman" panose="02020603050405020304" pitchFamily="18" charset="0"/>
-                <a:cs typeface="Times New Roman" panose="02020603050405020304" pitchFamily="18" charset="0"/>
-              </a:rPr>
-              <a:t> Payment Method are more  </a:t>
-            </a:r>
-          </a:p>
-          <a:p>
-            <a:r>
-              <a:rPr lang="en-US" sz="1600" dirty="0">
-                <a:latin typeface="Times New Roman" panose="02020603050405020304" pitchFamily="18" charset="0"/>
-                <a:cs typeface="Times New Roman" panose="02020603050405020304" pitchFamily="18" charset="0"/>
-              </a:rPr>
-              <a:t>  likely to churn.</a:t>
-            </a:r>
+              <a:t>• </a:t>
+            </a:r>
+            <a:r>
+              <a:rPr lang="en-US" sz="1400" b="0" i="0" dirty="0">
+                <a:solidFill>
+                  <a:srgbClr val="000000"/>
+                </a:solidFill>
+                <a:effectLst/>
+                <a:latin typeface="Helvetica Neue"/>
+              </a:rPr>
+              <a:t>Customers opted for </a:t>
+            </a:r>
+            <a:r>
+              <a:rPr lang="en-US" sz="1400" b="1" i="1" dirty="0">
+                <a:solidFill>
+                  <a:srgbClr val="000000"/>
+                </a:solidFill>
+                <a:effectLst/>
+                <a:latin typeface="Helvetica Neue"/>
+              </a:rPr>
+              <a:t>Electronic check as a </a:t>
+            </a:r>
+          </a:p>
+          <a:p>
+            <a:r>
+              <a:rPr lang="en-US" sz="1400" b="1" i="1" dirty="0">
+                <a:solidFill>
+                  <a:srgbClr val="000000"/>
+                </a:solidFill>
+                <a:latin typeface="Helvetica Neue"/>
+              </a:rPr>
+              <a:t>   </a:t>
+            </a:r>
+            <a:r>
+              <a:rPr lang="en-US" sz="1400" b="1" i="1" dirty="0">
+                <a:solidFill>
+                  <a:srgbClr val="000000"/>
+                </a:solidFill>
+                <a:effectLst/>
+                <a:latin typeface="Helvetica Neue"/>
+              </a:rPr>
+              <a:t>Payment method are more churners.</a:t>
+            </a:r>
+            <a:endParaRPr lang="en-US" sz="1600" i="1" dirty="0">
+              <a:latin typeface="Times New Roman" panose="02020603050405020304" pitchFamily="18" charset="0"/>
+              <a:cs typeface="Times New Roman" panose="02020603050405020304" pitchFamily="18" charset="0"/>
+            </a:endParaRPr>
           </a:p>
         </p:txBody>
       </p:sp>
@@ -12451,154 +12693,185 @@
                 <a:latin typeface="Times New Roman" panose="02020603050405020304" pitchFamily="18" charset="0"/>
                 <a:cs typeface="Times New Roman" panose="02020603050405020304" pitchFamily="18" charset="0"/>
               </a:rPr>
-              <a:t>• Subscribers that </a:t>
-            </a:r>
-            <a:r>
-              <a:rPr lang="en-US" sz="1600" b="1" i="1" dirty="0">
-                <a:latin typeface="Times New Roman" panose="02020603050405020304" pitchFamily="18" charset="0"/>
-                <a:cs typeface="Times New Roman" panose="02020603050405020304" pitchFamily="18" charset="0"/>
-              </a:rPr>
-              <a:t>don’t have Partner </a:t>
-            </a:r>
+              <a:t>• </a:t>
+            </a:r>
+            <a:r>
+              <a:rPr lang="en-US" sz="1400" b="0" i="0" dirty="0">
+                <a:solidFill>
+                  <a:srgbClr val="000000"/>
+                </a:solidFill>
+                <a:effectLst/>
+                <a:latin typeface="Helvetica Neue"/>
+              </a:rPr>
+              <a:t>Customers who </a:t>
+            </a:r>
+            <a:r>
+              <a:rPr lang="en-US" sz="1400" b="1" i="1" dirty="0">
+                <a:solidFill>
+                  <a:srgbClr val="000000"/>
+                </a:solidFill>
+                <a:effectLst/>
+                <a:latin typeface="Helvetica Neue"/>
+              </a:rPr>
+              <a:t>do not have Partners and not </a:t>
+            </a:r>
+          </a:p>
+          <a:p>
+            <a:r>
+              <a:rPr lang="en-US" sz="1400" b="1" i="1" dirty="0">
+                <a:solidFill>
+                  <a:srgbClr val="000000"/>
+                </a:solidFill>
+                <a:latin typeface="Helvetica Neue"/>
+              </a:rPr>
+              <a:t>  </a:t>
+            </a:r>
+            <a:r>
+              <a:rPr lang="en-US" sz="1400" b="1" i="1" dirty="0" err="1">
+                <a:solidFill>
+                  <a:srgbClr val="000000"/>
+                </a:solidFill>
+                <a:effectLst/>
+                <a:latin typeface="Helvetica Neue"/>
+              </a:rPr>
+              <a:t>StreamingTV</a:t>
+            </a:r>
+            <a:r>
+              <a:rPr lang="en-US" sz="1400" b="1" i="1" dirty="0">
+                <a:solidFill>
+                  <a:srgbClr val="000000"/>
+                </a:solidFill>
+                <a:effectLst/>
+                <a:latin typeface="Helvetica Neue"/>
+              </a:rPr>
+              <a:t> are more Churners.</a:t>
+            </a:r>
+            <a:endParaRPr lang="en-US" sz="1600" i="1" dirty="0">
+              <a:latin typeface="Times New Roman" panose="02020603050405020304" pitchFamily="18" charset="0"/>
+              <a:cs typeface="Times New Roman" panose="02020603050405020304" pitchFamily="18" charset="0"/>
+            </a:endParaRPr>
+          </a:p>
+        </p:txBody>
+      </p:sp>
+      <p:sp>
+        <p:nvSpPr>
+          <p:cNvPr id="7" name="TextBox 6">
+            <a:extLst>
+              <a:ext uri="{FF2B5EF4-FFF2-40B4-BE49-F238E27FC236}">
+                <a16:creationId xmlns:a16="http://schemas.microsoft.com/office/drawing/2014/main" id="{B939AC0A-B335-8144-92FF-1D3D23C78F7E}"/>
+              </a:ext>
+            </a:extLst>
+          </p:cNvPr>
+          <p:cNvSpPr txBox="1"/>
+          <p:nvPr/>
+        </p:nvSpPr>
+        <p:spPr>
+          <a:xfrm>
+            <a:off x="4797903" y="3879739"/>
+            <a:ext cx="4382610" cy="1015663"/>
+          </a:xfrm>
+          <a:prstGeom prst="rect">
+            <a:avLst/>
+          </a:prstGeom>
+          <a:noFill/>
+        </p:spPr>
+        <p:txBody>
+          <a:bodyPr wrap="square" rtlCol="0">
+            <a:spAutoFit/>
+          </a:bodyPr>
+          <a:lstStyle/>
+          <a:p>
+            <a:r>
+              <a:rPr lang="en-US" sz="1600" b="1" dirty="0"/>
+              <a:t>Variable</a:t>
+            </a:r>
+            <a:r>
+              <a:rPr lang="en-US" sz="1600" dirty="0"/>
+              <a:t> : Contract    </a:t>
+            </a:r>
+            <a:r>
+              <a:rPr lang="en-US" sz="1600" b="1" dirty="0"/>
+              <a:t>Hue</a:t>
+            </a:r>
+            <a:r>
+              <a:rPr lang="en-US" sz="1600" dirty="0"/>
+              <a:t> : Partner</a:t>
+            </a:r>
+          </a:p>
+          <a:p>
             <a:r>
               <a:rPr lang="en-US" sz="1600" dirty="0">
                 <a:latin typeface="Times New Roman" panose="02020603050405020304" pitchFamily="18" charset="0"/>
                 <a:cs typeface="Times New Roman" panose="02020603050405020304" pitchFamily="18" charset="0"/>
               </a:rPr>
-              <a:t>and </a:t>
-            </a:r>
-            <a:r>
-              <a:rPr lang="en-US" sz="1600" b="1" i="1" dirty="0">
-                <a:latin typeface="Times New Roman" panose="02020603050405020304" pitchFamily="18" charset="0"/>
-                <a:cs typeface="Times New Roman" panose="02020603050405020304" pitchFamily="18" charset="0"/>
-              </a:rPr>
-              <a:t>aren’t </a:t>
-            </a:r>
-          </a:p>
-          <a:p>
-            <a:r>
-              <a:rPr lang="en-US" sz="1600" b="1" i="1" dirty="0">
-                <a:latin typeface="Times New Roman" panose="02020603050405020304" pitchFamily="18" charset="0"/>
-                <a:cs typeface="Times New Roman" panose="02020603050405020304" pitchFamily="18" charset="0"/>
-              </a:rPr>
-              <a:t>  </a:t>
-            </a:r>
-            <a:r>
-              <a:rPr lang="en-US" sz="1600" b="1" i="1" dirty="0" err="1">
-                <a:latin typeface="Times New Roman" panose="02020603050405020304" pitchFamily="18" charset="0"/>
-                <a:cs typeface="Times New Roman" panose="02020603050405020304" pitchFamily="18" charset="0"/>
-              </a:rPr>
-              <a:t>streamingTV</a:t>
-            </a:r>
-            <a:r>
-              <a:rPr lang="en-US" sz="1600" dirty="0">
-                <a:latin typeface="Times New Roman" panose="02020603050405020304" pitchFamily="18" charset="0"/>
-                <a:cs typeface="Times New Roman" panose="02020603050405020304" pitchFamily="18" charset="0"/>
-              </a:rPr>
-              <a:t> are more likely to churn.</a:t>
-            </a:r>
-          </a:p>
-        </p:txBody>
-      </p:sp>
-      <p:sp>
-        <p:nvSpPr>
-          <p:cNvPr id="7" name="TextBox 6">
-            <a:extLst>
-              <a:ext uri="{FF2B5EF4-FFF2-40B4-BE49-F238E27FC236}">
-                <a16:creationId xmlns:a16="http://schemas.microsoft.com/office/drawing/2014/main" id="{B939AC0A-B335-8144-92FF-1D3D23C78F7E}"/>
-              </a:ext>
-            </a:extLst>
-          </p:cNvPr>
-          <p:cNvSpPr txBox="1"/>
-          <p:nvPr/>
-        </p:nvSpPr>
-        <p:spPr>
-          <a:xfrm>
-            <a:off x="4969397" y="3930961"/>
-            <a:ext cx="4211116" cy="1077218"/>
-          </a:xfrm>
-          <a:prstGeom prst="rect">
-            <a:avLst/>
-          </a:prstGeom>
-          <a:noFill/>
-        </p:spPr>
-        <p:txBody>
-          <a:bodyPr wrap="square" rtlCol="0">
-            <a:spAutoFit/>
-          </a:bodyPr>
-          <a:lstStyle/>
-          <a:p>
-            <a:r>
-              <a:rPr lang="en-US" sz="1600" b="1" dirty="0"/>
-              <a:t>Variable</a:t>
-            </a:r>
-            <a:r>
-              <a:rPr lang="en-US" sz="1600" dirty="0"/>
-              <a:t> : Contract    </a:t>
-            </a:r>
-            <a:r>
-              <a:rPr lang="en-US" sz="1600" b="1" dirty="0"/>
-              <a:t>Hue</a:t>
-            </a:r>
-            <a:r>
-              <a:rPr lang="en-US" sz="1600" dirty="0"/>
-              <a:t> : Partner</a:t>
-            </a:r>
-          </a:p>
-          <a:p>
-            <a:r>
-              <a:rPr lang="en-US" sz="1600" dirty="0">
-                <a:latin typeface="Times New Roman" panose="02020603050405020304" pitchFamily="18" charset="0"/>
-                <a:cs typeface="Times New Roman" panose="02020603050405020304" pitchFamily="18" charset="0"/>
-              </a:rPr>
-              <a:t>• Subscribers that </a:t>
-            </a:r>
-            <a:r>
-              <a:rPr lang="en-US" sz="1600" b="1" i="1" dirty="0">
-                <a:latin typeface="Times New Roman" panose="02020603050405020304" pitchFamily="18" charset="0"/>
-                <a:cs typeface="Times New Roman" panose="02020603050405020304" pitchFamily="18" charset="0"/>
-              </a:rPr>
-              <a:t>don’t have Partner </a:t>
-            </a:r>
-            <a:r>
-              <a:rPr lang="en-US" sz="1600" dirty="0">
-                <a:latin typeface="Times New Roman" panose="02020603050405020304" pitchFamily="18" charset="0"/>
-                <a:cs typeface="Times New Roman" panose="02020603050405020304" pitchFamily="18" charset="0"/>
-              </a:rPr>
-              <a:t>and opted  </a:t>
-            </a:r>
-          </a:p>
-          <a:p>
-            <a:r>
-              <a:rPr lang="en-US" sz="1600" dirty="0">
-                <a:latin typeface="Times New Roman" panose="02020603050405020304" pitchFamily="18" charset="0"/>
-                <a:cs typeface="Times New Roman" panose="02020603050405020304" pitchFamily="18" charset="0"/>
-              </a:rPr>
-              <a:t>  for </a:t>
-            </a:r>
-            <a:r>
-              <a:rPr lang="en-US" sz="1600" b="1" i="1" dirty="0">
-                <a:latin typeface="Times New Roman" panose="02020603050405020304" pitchFamily="18" charset="0"/>
-                <a:cs typeface="Times New Roman" panose="02020603050405020304" pitchFamily="18" charset="0"/>
-              </a:rPr>
-              <a:t>month-to-month</a:t>
-            </a:r>
-            <a:r>
-              <a:rPr lang="en-US" sz="1600" dirty="0">
-                <a:latin typeface="Times New Roman" panose="02020603050405020304" pitchFamily="18" charset="0"/>
-                <a:cs typeface="Times New Roman" panose="02020603050405020304" pitchFamily="18" charset="0"/>
-              </a:rPr>
-              <a:t> contract are more  </a:t>
-            </a:r>
-          </a:p>
-          <a:p>
-            <a:r>
-              <a:rPr lang="en-US" sz="1600" dirty="0">
-                <a:latin typeface="Times New Roman" panose="02020603050405020304" pitchFamily="18" charset="0"/>
-                <a:cs typeface="Times New Roman" panose="02020603050405020304" pitchFamily="18" charset="0"/>
-              </a:rPr>
-              <a:t>  likely to churn.</a:t>
-            </a:r>
+              <a:t>• </a:t>
+            </a:r>
+            <a:r>
+              <a:rPr lang="en-US" sz="1400" b="0" i="0" dirty="0">
+                <a:solidFill>
+                  <a:srgbClr val="000000"/>
+                </a:solidFill>
+                <a:effectLst/>
+                <a:latin typeface="Helvetica Neue"/>
+              </a:rPr>
+              <a:t>Customers who </a:t>
+            </a:r>
+            <a:r>
+              <a:rPr lang="en-US" sz="1400" b="1" i="1" dirty="0">
+                <a:solidFill>
+                  <a:srgbClr val="000000"/>
+                </a:solidFill>
+                <a:effectLst/>
+                <a:latin typeface="Helvetica Neue"/>
+              </a:rPr>
+              <a:t>do not have Partners and opted </a:t>
+            </a:r>
+          </a:p>
+          <a:p>
+            <a:r>
+              <a:rPr lang="en-US" sz="1400" b="1" i="1" dirty="0">
+                <a:solidFill>
+                  <a:srgbClr val="000000"/>
+                </a:solidFill>
+                <a:latin typeface="Helvetica Neue"/>
+              </a:rPr>
+              <a:t>   </a:t>
+            </a:r>
+            <a:r>
+              <a:rPr lang="en-US" sz="1400" b="1" i="1" dirty="0">
+                <a:solidFill>
+                  <a:srgbClr val="000000"/>
+                </a:solidFill>
+                <a:effectLst/>
+                <a:latin typeface="Helvetica Neue"/>
+              </a:rPr>
+              <a:t>for month-to-month contract are more  </a:t>
+            </a:r>
+          </a:p>
+          <a:p>
+            <a:r>
+              <a:rPr lang="en-US" sz="1400" b="1" i="1" dirty="0">
+                <a:solidFill>
+                  <a:srgbClr val="000000"/>
+                </a:solidFill>
+                <a:latin typeface="Helvetica Neue"/>
+              </a:rPr>
+              <a:t>   </a:t>
+            </a:r>
+            <a:r>
+              <a:rPr lang="en-US" sz="1400" b="1" i="1" dirty="0">
+                <a:solidFill>
+                  <a:srgbClr val="000000"/>
+                </a:solidFill>
+                <a:effectLst/>
+                <a:latin typeface="Helvetica Neue"/>
+              </a:rPr>
+              <a:t>churners.</a:t>
+            </a:r>
+            <a:endParaRPr lang="en-US" sz="1600" i="1" dirty="0">
+              <a:latin typeface="Times New Roman" panose="02020603050405020304" pitchFamily="18" charset="0"/>
+              <a:cs typeface="Times New Roman" panose="02020603050405020304" pitchFamily="18" charset="0"/>
+            </a:endParaRPr>
           </a:p>
         </p:txBody>
       </p:sp>
@@ -13424,7 +13697,7 @@
         <p:spPr>
           <a:xfrm>
             <a:off x="1092820" y="3964413"/>
-            <a:ext cx="6947301" cy="830997"/>
+            <a:ext cx="7281746" cy="800219"/>
           </a:xfrm>
           <a:prstGeom prst="rect">
             <a:avLst/>
@@ -13468,45 +13741,53 @@
                 <a:latin typeface="Times New Roman" panose="02020603050405020304" pitchFamily="18" charset="0"/>
                 <a:cs typeface="Times New Roman" panose="02020603050405020304" pitchFamily="18" charset="0"/>
               </a:rPr>
-              <a:t>• Subscribers that </a:t>
-            </a:r>
-            <a:r>
-              <a:rPr lang="en-US" sz="1600" b="1" i="1" dirty="0">
-                <a:latin typeface="Times New Roman" panose="02020603050405020304" pitchFamily="18" charset="0"/>
-                <a:cs typeface="Times New Roman" panose="02020603050405020304" pitchFamily="18" charset="0"/>
-              </a:rPr>
-              <a:t>don’t have Partner </a:t>
-            </a:r>
-            <a:r>
-              <a:rPr lang="en-US" sz="1600" dirty="0">
-                <a:latin typeface="Times New Roman" panose="02020603050405020304" pitchFamily="18" charset="0"/>
-                <a:cs typeface="Times New Roman" panose="02020603050405020304" pitchFamily="18" charset="0"/>
-              </a:rPr>
-              <a:t>and opted for </a:t>
-            </a:r>
-            <a:r>
-              <a:rPr lang="en-US" sz="1600" b="1" i="1" dirty="0">
-                <a:latin typeface="Times New Roman" panose="02020603050405020304" pitchFamily="18" charset="0"/>
-                <a:cs typeface="Times New Roman" panose="02020603050405020304" pitchFamily="18" charset="0"/>
-              </a:rPr>
-              <a:t>Electronic-check</a:t>
-            </a:r>
-            <a:r>
-              <a:rPr lang="en-US" sz="1600" dirty="0">
-                <a:latin typeface="Times New Roman" panose="02020603050405020304" pitchFamily="18" charset="0"/>
-                <a:cs typeface="Times New Roman" panose="02020603050405020304" pitchFamily="18" charset="0"/>
-              </a:rPr>
-              <a:t> Payment  </a:t>
-            </a:r>
-          </a:p>
-          <a:p>
-            <a:r>
-              <a:rPr lang="en-US" sz="1600" dirty="0">
-                <a:latin typeface="Times New Roman" panose="02020603050405020304" pitchFamily="18" charset="0"/>
-                <a:cs typeface="Times New Roman" panose="02020603050405020304" pitchFamily="18" charset="0"/>
-              </a:rPr>
-              <a:t>  Method are more likely to churn.</a:t>
-            </a:r>
+              <a:t>• </a:t>
+            </a:r>
+            <a:r>
+              <a:rPr lang="en-US" sz="1400" b="0" i="0" dirty="0">
+                <a:solidFill>
+                  <a:srgbClr val="000000"/>
+                </a:solidFill>
+                <a:effectLst/>
+                <a:latin typeface="Helvetica Neue"/>
+              </a:rPr>
+              <a:t>Customers who </a:t>
+            </a:r>
+            <a:r>
+              <a:rPr lang="en-US" sz="1400" b="1" i="1" dirty="0">
+                <a:solidFill>
+                  <a:srgbClr val="000000"/>
+                </a:solidFill>
+                <a:effectLst/>
+                <a:latin typeface="Helvetica Neue"/>
+              </a:rPr>
+              <a:t>do not have Partners and opted for Electronic check as Payment  </a:t>
+            </a:r>
+          </a:p>
+          <a:p>
+            <a:r>
+              <a:rPr lang="en-US" sz="1400" b="1" i="1" dirty="0">
+                <a:solidFill>
+                  <a:srgbClr val="000000"/>
+                </a:solidFill>
+                <a:latin typeface="Helvetica Neue"/>
+              </a:rPr>
+              <a:t>   </a:t>
+            </a:r>
+            <a:r>
+              <a:rPr lang="en-US" sz="1400" b="1" i="1" dirty="0">
+                <a:solidFill>
+                  <a:srgbClr val="000000"/>
+                </a:solidFill>
+                <a:effectLst/>
+                <a:latin typeface="Helvetica Neue"/>
+              </a:rPr>
+              <a:t>method are more Churners.</a:t>
+            </a:r>
+            <a:endParaRPr lang="en-US" sz="1600" i="1" dirty="0">
+              <a:latin typeface="Times New Roman" panose="02020603050405020304" pitchFamily="18" charset="0"/>
+              <a:cs typeface="Times New Roman" panose="02020603050405020304" pitchFamily="18" charset="0"/>
+            </a:endParaRPr>
           </a:p>
         </p:txBody>
       </p:sp>
@@ -13834,7 +14115,7 @@
         </p:nvSpPr>
         <p:spPr>
           <a:xfrm>
-            <a:off x="468260" y="3930962"/>
+            <a:off x="468260" y="3890476"/>
             <a:ext cx="4382611" cy="830997"/>
           </a:xfrm>
           <a:prstGeom prst="rect">
@@ -13876,167 +14157,187 @@
                 <a:latin typeface="Times New Roman" panose="02020603050405020304" pitchFamily="18" charset="0"/>
                 <a:cs typeface="Times New Roman" panose="02020603050405020304" pitchFamily="18" charset="0"/>
               </a:rPr>
-              <a:t>• Subscribers with </a:t>
-            </a:r>
-            <a:r>
-              <a:rPr lang="en-US" sz="1600" b="1" i="1" dirty="0">
-                <a:latin typeface="Times New Roman" panose="02020603050405020304" pitchFamily="18" charset="0"/>
-                <a:cs typeface="Times New Roman" panose="02020603050405020304" pitchFamily="18" charset="0"/>
-              </a:rPr>
-              <a:t>month-to-month</a:t>
-            </a:r>
+              <a:t>• </a:t>
+            </a:r>
+            <a:r>
+              <a:rPr lang="en-US" sz="1400" b="0" i="0" dirty="0">
+                <a:solidFill>
+                  <a:srgbClr val="000000"/>
+                </a:solidFill>
+                <a:effectLst/>
+                <a:latin typeface="Helvetica Neue"/>
+              </a:rPr>
+              <a:t>Customers who are </a:t>
+            </a:r>
+            <a:r>
+              <a:rPr lang="en-US" sz="1400" b="1" i="1" dirty="0">
+                <a:solidFill>
+                  <a:srgbClr val="000000"/>
+                </a:solidFill>
+                <a:effectLst/>
+                <a:latin typeface="Helvetica Neue"/>
+              </a:rPr>
+              <a:t>not </a:t>
+            </a:r>
+            <a:r>
+              <a:rPr lang="en-US" sz="1400" b="1" i="1" dirty="0" err="1">
+                <a:solidFill>
+                  <a:srgbClr val="000000"/>
+                </a:solidFill>
+                <a:effectLst/>
+                <a:latin typeface="Helvetica Neue"/>
+              </a:rPr>
+              <a:t>StreamingTV</a:t>
+            </a:r>
+            <a:r>
+              <a:rPr lang="en-US" sz="1400" b="1" i="1" dirty="0">
+                <a:solidFill>
+                  <a:srgbClr val="000000"/>
+                </a:solidFill>
+                <a:effectLst/>
+                <a:latin typeface="Helvetica Neue"/>
+              </a:rPr>
+              <a:t> and opted   </a:t>
+            </a:r>
+          </a:p>
+          <a:p>
+            <a:r>
+              <a:rPr lang="en-US" sz="1400" b="1" i="1" dirty="0">
+                <a:solidFill>
+                  <a:srgbClr val="000000"/>
+                </a:solidFill>
+                <a:latin typeface="Helvetica Neue"/>
+              </a:rPr>
+              <a:t>  </a:t>
+            </a:r>
+            <a:r>
+              <a:rPr lang="en-US" sz="1400" b="1" i="1" dirty="0">
+                <a:solidFill>
+                  <a:srgbClr val="000000"/>
+                </a:solidFill>
+                <a:effectLst/>
+                <a:latin typeface="Helvetica Neue"/>
+              </a:rPr>
+              <a:t>for month-to-month contract are more churners.</a:t>
+            </a:r>
+            <a:endParaRPr lang="en-US" sz="1600" i="1" dirty="0">
+              <a:latin typeface="Times New Roman" panose="02020603050405020304" pitchFamily="18" charset="0"/>
+              <a:cs typeface="Times New Roman" panose="02020603050405020304" pitchFamily="18" charset="0"/>
+            </a:endParaRPr>
+          </a:p>
+        </p:txBody>
+      </p:sp>
+      <p:sp>
+        <p:nvSpPr>
+          <p:cNvPr id="7" name="TextBox 6">
+            <a:extLst>
+              <a:ext uri="{FF2B5EF4-FFF2-40B4-BE49-F238E27FC236}">
+                <a16:creationId xmlns:a16="http://schemas.microsoft.com/office/drawing/2014/main" id="{056480AC-B891-46C3-D4C6-4DAAED010C68}"/>
+              </a:ext>
+            </a:extLst>
+          </p:cNvPr>
+          <p:cNvSpPr txBox="1"/>
+          <p:nvPr/>
+        </p:nvSpPr>
+        <p:spPr>
+          <a:xfrm>
+            <a:off x="4969397" y="3890476"/>
+            <a:ext cx="4211116" cy="800219"/>
+          </a:xfrm>
+          <a:prstGeom prst="rect">
+            <a:avLst/>
+          </a:prstGeom>
+          <a:noFill/>
+        </p:spPr>
+        <p:txBody>
+          <a:bodyPr wrap="square" rtlCol="0">
+            <a:spAutoFit/>
+          </a:bodyPr>
+          <a:lstStyle/>
+          <a:p>
+            <a:r>
+              <a:rPr lang="en-US" sz="1600" b="1" dirty="0"/>
+              <a:t>Variable</a:t>
+            </a:r>
+            <a:r>
+              <a:rPr lang="en-US" sz="1600" dirty="0"/>
+              <a:t> : </a:t>
+            </a:r>
+            <a:r>
+              <a:rPr lang="en-US" sz="1600" dirty="0" err="1"/>
+              <a:t>PaymentMethod</a:t>
+            </a:r>
+            <a:r>
+              <a:rPr lang="en-US" sz="1600" dirty="0"/>
+              <a:t>    </a:t>
+            </a:r>
+            <a:r>
+              <a:rPr lang="en-US" sz="1600" b="1" dirty="0"/>
+              <a:t>Hue</a:t>
+            </a:r>
+            <a:r>
+              <a:rPr lang="en-US" sz="1600" dirty="0"/>
+              <a:t> : </a:t>
+            </a:r>
+            <a:r>
+              <a:rPr lang="en-US" sz="1600" dirty="0" err="1"/>
+              <a:t>StreamingTV</a:t>
+            </a:r>
+            <a:endParaRPr lang="en-US" sz="1600" dirty="0"/>
+          </a:p>
+          <a:p>
             <a:r>
               <a:rPr lang="en-US" sz="1600" dirty="0">
                 <a:latin typeface="Times New Roman" panose="02020603050405020304" pitchFamily="18" charset="0"/>
                 <a:cs typeface="Times New Roman" panose="02020603050405020304" pitchFamily="18" charset="0"/>
               </a:rPr>
-              <a:t> contract and  </a:t>
-            </a:r>
-          </a:p>
-          <a:p>
-            <a:r>
-              <a:rPr lang="en-US" sz="1600" dirty="0">
-                <a:latin typeface="Times New Roman" panose="02020603050405020304" pitchFamily="18" charset="0"/>
-                <a:cs typeface="Times New Roman" panose="02020603050405020304" pitchFamily="18" charset="0"/>
-              </a:rPr>
-              <a:t>  are </a:t>
-            </a:r>
-            <a:r>
-              <a:rPr lang="en-US" sz="1600" b="1" i="1" dirty="0" err="1">
-                <a:latin typeface="Times New Roman" panose="02020603050405020304" pitchFamily="18" charset="0"/>
-                <a:cs typeface="Times New Roman" panose="02020603050405020304" pitchFamily="18" charset="0"/>
-              </a:rPr>
-              <a:t>streamingTV</a:t>
-            </a:r>
-            <a:r>
-              <a:rPr lang="en-US" sz="1600" b="1" i="1" dirty="0">
-                <a:latin typeface="Times New Roman" panose="02020603050405020304" pitchFamily="18" charset="0"/>
-                <a:cs typeface="Times New Roman" panose="02020603050405020304" pitchFamily="18" charset="0"/>
-              </a:rPr>
-              <a:t> or not </a:t>
-            </a:r>
-            <a:r>
-              <a:rPr lang="en-US" sz="1600" dirty="0">
-                <a:latin typeface="Times New Roman" panose="02020603050405020304" pitchFamily="18" charset="0"/>
-                <a:cs typeface="Times New Roman" panose="02020603050405020304" pitchFamily="18" charset="0"/>
-              </a:rPr>
-              <a:t>are more likely to churn.</a:t>
-            </a:r>
-          </a:p>
-        </p:txBody>
-      </p:sp>
-      <p:sp>
-        <p:nvSpPr>
-          <p:cNvPr id="7" name="TextBox 6">
-            <a:extLst>
-              <a:ext uri="{FF2B5EF4-FFF2-40B4-BE49-F238E27FC236}">
-                <a16:creationId xmlns:a16="http://schemas.microsoft.com/office/drawing/2014/main" id="{056480AC-B891-46C3-D4C6-4DAAED010C68}"/>
-              </a:ext>
-            </a:extLst>
-          </p:cNvPr>
-          <p:cNvSpPr txBox="1"/>
-          <p:nvPr/>
-        </p:nvSpPr>
-        <p:spPr>
-          <a:xfrm>
-            <a:off x="4969397" y="3930961"/>
-            <a:ext cx="4211116" cy="1077218"/>
-          </a:xfrm>
-          <a:prstGeom prst="rect">
-            <a:avLst/>
-          </a:prstGeom>
-          <a:noFill/>
-        </p:spPr>
-        <p:txBody>
-          <a:bodyPr wrap="square" rtlCol="0">
-            <a:spAutoFit/>
-          </a:bodyPr>
-          <a:lstStyle/>
-          <a:p>
-            <a:r>
-              <a:rPr lang="en-US" sz="1600" b="1" dirty="0"/>
-              <a:t>Variable</a:t>
-            </a:r>
-            <a:r>
-              <a:rPr lang="en-US" sz="1600" dirty="0"/>
-              <a:t> : </a:t>
-            </a:r>
-            <a:r>
-              <a:rPr lang="en-US" sz="1600" dirty="0" err="1"/>
-              <a:t>PaymentMethod</a:t>
-            </a:r>
-            <a:r>
-              <a:rPr lang="en-US" sz="1600" dirty="0"/>
-              <a:t>    </a:t>
-            </a:r>
-            <a:r>
-              <a:rPr lang="en-US" sz="1600" b="1" dirty="0"/>
-              <a:t>Hue</a:t>
-            </a:r>
-            <a:r>
-              <a:rPr lang="en-US" sz="1600" dirty="0"/>
-              <a:t> : </a:t>
-            </a:r>
-            <a:r>
-              <a:rPr lang="en-US" sz="1600" dirty="0" err="1"/>
-              <a:t>StreamingTV</a:t>
-            </a:r>
-            <a:endParaRPr lang="en-US" sz="1600" dirty="0"/>
-          </a:p>
-          <a:p>
-            <a:r>
-              <a:rPr lang="en-US" sz="1600" dirty="0">
-                <a:latin typeface="Times New Roman" panose="02020603050405020304" pitchFamily="18" charset="0"/>
-                <a:cs typeface="Times New Roman" panose="02020603050405020304" pitchFamily="18" charset="0"/>
-              </a:rPr>
-              <a:t>• Subscribers that opted for </a:t>
-            </a:r>
-            <a:r>
-              <a:rPr lang="en-US" sz="1600" b="1" i="1" dirty="0">
-                <a:latin typeface="Times New Roman" panose="02020603050405020304" pitchFamily="18" charset="0"/>
-                <a:cs typeface="Times New Roman" panose="02020603050405020304" pitchFamily="18" charset="0"/>
-              </a:rPr>
-              <a:t>Electronic-check</a:t>
-            </a:r>
-            <a:r>
-              <a:rPr lang="en-US" sz="1600" dirty="0">
-                <a:latin typeface="Times New Roman" panose="02020603050405020304" pitchFamily="18" charset="0"/>
-                <a:cs typeface="Times New Roman" panose="02020603050405020304" pitchFamily="18" charset="0"/>
-              </a:rPr>
-              <a:t> </a:t>
-            </a:r>
-          </a:p>
-          <a:p>
-            <a:r>
-              <a:rPr lang="en-US" sz="1600" dirty="0">
-                <a:latin typeface="Times New Roman" panose="02020603050405020304" pitchFamily="18" charset="0"/>
-                <a:cs typeface="Times New Roman" panose="02020603050405020304" pitchFamily="18" charset="0"/>
-              </a:rPr>
-              <a:t>  Payment Method and are </a:t>
-            </a:r>
-            <a:r>
-              <a:rPr lang="en-US" sz="1600" b="1" i="1" dirty="0" err="1">
-                <a:latin typeface="Times New Roman" panose="02020603050405020304" pitchFamily="18" charset="0"/>
-                <a:cs typeface="Times New Roman" panose="02020603050405020304" pitchFamily="18" charset="0"/>
-              </a:rPr>
-              <a:t>streamingTV</a:t>
-            </a:r>
-            <a:r>
-              <a:rPr lang="en-US" sz="1600" b="1" i="1" dirty="0">
-                <a:latin typeface="Times New Roman" panose="02020603050405020304" pitchFamily="18" charset="0"/>
-                <a:cs typeface="Times New Roman" panose="02020603050405020304" pitchFamily="18" charset="0"/>
-              </a:rPr>
-              <a:t> or not </a:t>
-            </a:r>
-          </a:p>
-          <a:p>
-            <a:r>
-              <a:rPr lang="en-US" sz="1600" dirty="0">
-                <a:latin typeface="Times New Roman" panose="02020603050405020304" pitchFamily="18" charset="0"/>
-                <a:cs typeface="Times New Roman" panose="02020603050405020304" pitchFamily="18" charset="0"/>
-              </a:rPr>
-              <a:t>  are more likely to churn.</a:t>
-            </a:r>
+              <a:t>• </a:t>
+            </a:r>
+            <a:r>
+              <a:rPr lang="en-US" sz="1400" b="0" i="0" dirty="0">
+                <a:solidFill>
+                  <a:srgbClr val="000000"/>
+                </a:solidFill>
+                <a:effectLst/>
+                <a:latin typeface="Helvetica Neue"/>
+              </a:rPr>
+              <a:t>Customers who opted for </a:t>
+            </a:r>
+            <a:r>
+              <a:rPr lang="en-US" sz="1400" b="1" i="1" dirty="0">
+                <a:solidFill>
+                  <a:srgbClr val="000000"/>
+                </a:solidFill>
+                <a:effectLst/>
+                <a:latin typeface="Helvetica Neue"/>
+              </a:rPr>
+              <a:t>Electronic check as a </a:t>
+            </a:r>
+          </a:p>
+          <a:p>
+            <a:r>
+              <a:rPr lang="en-US" sz="1400" b="1" i="1" dirty="0">
+                <a:solidFill>
+                  <a:srgbClr val="000000"/>
+                </a:solidFill>
+                <a:latin typeface="Helvetica Neue"/>
+              </a:rPr>
+              <a:t>   </a:t>
+            </a:r>
+            <a:r>
+              <a:rPr lang="en-US" sz="1400" b="1" i="1" dirty="0">
+                <a:solidFill>
+                  <a:srgbClr val="000000"/>
+                </a:solidFill>
+                <a:effectLst/>
+                <a:latin typeface="Helvetica Neue"/>
+              </a:rPr>
+              <a:t>Payment method are more Churners.</a:t>
+            </a:r>
+            <a:endParaRPr lang="en-US" sz="1600" i="1" dirty="0">
+              <a:latin typeface="Times New Roman" panose="02020603050405020304" pitchFamily="18" charset="0"/>
+              <a:cs typeface="Times New Roman" panose="02020603050405020304" pitchFamily="18" charset="0"/>
+            </a:endParaRPr>
           </a:p>
         </p:txBody>
       </p:sp>
@@ -14503,7 +14804,7 @@
         <p:spPr>
           <a:xfrm>
             <a:off x="1092820" y="3984346"/>
-            <a:ext cx="6322833" cy="830997"/>
+            <a:ext cx="6322833" cy="584775"/>
           </a:xfrm>
           <a:prstGeom prst="rect">
             <a:avLst/>
@@ -14678,104 +14979,52 @@
                 <a:ea typeface="+mn-ea"/>
                 <a:cs typeface="Times New Roman" panose="02020603050405020304" pitchFamily="18" charset="0"/>
               </a:rPr>
-              <a:t>• Subscribers that</a:t>
-            </a:r>
-            <a:r>
-              <a:rPr lang="en-US" sz="1600" dirty="0">
-                <a:solidFill>
-                  <a:prstClr val="black"/>
-                </a:solidFill>
-                <a:latin typeface="Times New Roman" panose="02020603050405020304" pitchFamily="18" charset="0"/>
-                <a:cs typeface="Times New Roman" panose="02020603050405020304" pitchFamily="18" charset="0"/>
-              </a:rPr>
-              <a:t> opted for </a:t>
-            </a:r>
-            <a:r>
-              <a:rPr lang="en-US" sz="1600" b="1" i="1" dirty="0">
-                <a:solidFill>
-                  <a:prstClr val="black"/>
-                </a:solidFill>
-                <a:latin typeface="Times New Roman" panose="02020603050405020304" pitchFamily="18" charset="0"/>
-                <a:cs typeface="Times New Roman" panose="02020603050405020304" pitchFamily="18" charset="0"/>
-              </a:rPr>
-              <a:t>Electronic-check</a:t>
-            </a:r>
-            <a:r>
-              <a:rPr lang="en-US" sz="1600" dirty="0">
-                <a:solidFill>
-                  <a:prstClr val="black"/>
-                </a:solidFill>
-                <a:latin typeface="Times New Roman" panose="02020603050405020304" pitchFamily="18" charset="0"/>
-                <a:cs typeface="Times New Roman" panose="02020603050405020304" pitchFamily="18" charset="0"/>
-              </a:rPr>
-              <a:t> Payment Method and have </a:t>
-            </a:r>
-          </a:p>
-          <a:p>
-            <a:pPr marL="0" marR="0" lvl="0" indent="0" algn="l" defTabSz="924001" rtl="0" eaLnBrk="1" fontAlgn="auto" latinLnBrk="0" hangingPunct="1">
-              <a:lnSpc>
-                <a:spcPct val="100000"/>
-              </a:lnSpc>
-              <a:spcBef>
-                <a:spcPts val="0"/>
-              </a:spcBef>
-              <a:spcAft>
-                <a:spcPts val="0"/>
-              </a:spcAft>
-              <a:buClrTx/>
-              <a:buSzTx/>
-              <a:buFontTx/>
-              <a:buNone/>
-              <a:tabLst/>
-              <a:defRPr/>
-            </a:pPr>
-            <a:r>
-              <a:rPr lang="en-US" sz="1600" dirty="0">
-                <a:solidFill>
-                  <a:prstClr val="black"/>
-                </a:solidFill>
-                <a:latin typeface="Times New Roman" panose="02020603050405020304" pitchFamily="18" charset="0"/>
-                <a:cs typeface="Times New Roman" panose="02020603050405020304" pitchFamily="18" charset="0"/>
-              </a:rPr>
-              <a:t>  </a:t>
-            </a:r>
-            <a:r>
-              <a:rPr lang="en-US" sz="1600" b="1" i="1" dirty="0">
-                <a:solidFill>
-                  <a:prstClr val="black"/>
-                </a:solidFill>
-                <a:latin typeface="Times New Roman" panose="02020603050405020304" pitchFamily="18" charset="0"/>
-                <a:cs typeface="Times New Roman" panose="02020603050405020304" pitchFamily="18" charset="0"/>
-              </a:rPr>
-              <a:t>month-to-month</a:t>
-            </a:r>
-            <a:r>
-              <a:rPr lang="en-US" sz="1600" dirty="0">
-                <a:solidFill>
-                  <a:prstClr val="black"/>
-                </a:solidFill>
-                <a:latin typeface="Times New Roman" panose="02020603050405020304" pitchFamily="18" charset="0"/>
-                <a:cs typeface="Times New Roman" panose="02020603050405020304" pitchFamily="18" charset="0"/>
-              </a:rPr>
-              <a:t> contract </a:t>
-            </a:r>
-            <a:r>
-              <a:rPr kumimoji="0" lang="en-US" sz="1600" b="0" i="0" u="none" strike="noStrike" kern="1200" cap="none" spc="0" normalizeH="0" baseline="0" noProof="0" dirty="0">
-                <a:ln>
-                  <a:noFill/>
-                </a:ln>
-                <a:solidFill>
-                  <a:prstClr val="black"/>
+              <a:t>• </a:t>
+            </a:r>
+            <a:r>
+              <a:rPr lang="en-US" sz="1400" b="0" i="0" dirty="0">
+                <a:solidFill>
+                  <a:srgbClr val="000000"/>
                 </a:solidFill>
                 <a:effectLst/>
-                <a:uLnTx/>
-                <a:uFillTx/>
-                <a:latin typeface="Times New Roman" panose="02020603050405020304" pitchFamily="18" charset="0"/>
-                <a:ea typeface="+mn-ea"/>
-                <a:cs typeface="Times New Roman" panose="02020603050405020304" pitchFamily="18" charset="0"/>
-              </a:rPr>
-              <a:t>are more likely to churn.</a:t>
-            </a:r>
+                <a:latin typeface="Helvetica Neue"/>
+              </a:rPr>
+              <a:t>Customers who have</a:t>
+            </a:r>
+            <a:r>
+              <a:rPr lang="en-US" sz="1400" b="0" i="1" dirty="0">
+                <a:solidFill>
+                  <a:srgbClr val="000000"/>
+                </a:solidFill>
+                <a:effectLst/>
+                <a:latin typeface="Helvetica Neue"/>
+              </a:rPr>
+              <a:t> </a:t>
+            </a:r>
+            <a:r>
+              <a:rPr lang="en-US" sz="1400" b="1" i="1" dirty="0">
+                <a:solidFill>
+                  <a:srgbClr val="000000"/>
+                </a:solidFill>
+                <a:effectLst/>
+                <a:latin typeface="Helvetica Neue"/>
+              </a:rPr>
+              <a:t>month-to-month contract are more Churners.</a:t>
+            </a:r>
+            <a:endParaRPr kumimoji="0" lang="en-US" sz="1600" b="0" i="1" u="none" strike="noStrike" kern="1200" cap="none" spc="0" normalizeH="0" baseline="0" noProof="0" dirty="0">
+              <a:ln>
+                <a:noFill/>
+              </a:ln>
+              <a:solidFill>
+                <a:prstClr val="black"/>
+              </a:solidFill>
+              <a:effectLst/>
+              <a:uLnTx/>
+              <a:uFillTx/>
+              <a:latin typeface="Times New Roman" panose="02020603050405020304" pitchFamily="18" charset="0"/>
+              <a:ea typeface="+mn-ea"/>
+              <a:cs typeface="Times New Roman" panose="02020603050405020304" pitchFamily="18" charset="0"/>
+            </a:endParaRPr>
           </a:p>
         </p:txBody>
       </p:sp>

</xml_diff>